<commit_message>
Updated powerpoint for OO foundations.
</commit_message>
<xml_diff>
--- a/presentations/03-oo-foundations-review.pptx
+++ b/presentations/03-oo-foundations-review.pptx
@@ -9848,6 +9848,36 @@
           </a:p>
         </p:txBody>
       </p:sp>
+      <p:pic>
+        <p:nvPicPr>
+          <p:cNvPr id="5" name="Picture 4">
+            <a:extLst>
+              <a:ext uri="{FF2B5EF4-FFF2-40B4-BE49-F238E27FC236}">
+                <a16:creationId xmlns:a16="http://schemas.microsoft.com/office/drawing/2014/main" id="{FD895E24-ABA5-2EBB-D150-FED91A9848BE}"/>
+              </a:ext>
+            </a:extLst>
+          </p:cNvPr>
+          <p:cNvPicPr>
+            <a:picLocks noChangeAspect="1"/>
+          </p:cNvPicPr>
+          <p:nvPr/>
+        </p:nvPicPr>
+        <p:blipFill>
+          <a:blip r:embed="rId3"/>
+          <a:stretch>
+            <a:fillRect/>
+          </a:stretch>
+        </p:blipFill>
+        <p:spPr>
+          <a:xfrm>
+            <a:off x="210611" y="225469"/>
+            <a:ext cx="1915625" cy="5283418"/>
+          </a:xfrm>
+          <a:prstGeom prst="rect">
+            <a:avLst/>
+          </a:prstGeom>
+        </p:spPr>
+      </p:pic>
     </p:spTree>
     <p:extLst>
       <p:ext uri="{BB962C8B-B14F-4D97-AF65-F5344CB8AC3E}">

</xml_diff>